<commit_message>
minors to pptx made by Daniele
</commit_message>
<xml_diff>
--- a/Mistri_Papetti_AML_presentazione.pptx
+++ b/Mistri_Papetti_AML_presentazione.pptx
@@ -390,7 +390,7 @@
             <a:fld id="{B61BEF0D-F0BB-DE4B-95CE-6DB70DBA9567}" type="datetimeFigureOut">
               <a:rPr lang="en-US" dirty="0"/>
               <a:pPr/>
-              <a:t>12/24/2019</a:t>
+              <a:t>1/8/2020</a:t>
             </a:fld>
             <a:endParaRPr lang="en-US" dirty="0"/>
           </a:p>
@@ -649,7 +649,7 @@
             <a:fld id="{B61BEF0D-F0BB-DE4B-95CE-6DB70DBA9567}" type="datetimeFigureOut">
               <a:rPr lang="en-US" dirty="0"/>
               <a:pPr/>
-              <a:t>12/24/2019</a:t>
+              <a:t>1/8/2020</a:t>
             </a:fld>
             <a:endParaRPr lang="en-US" dirty="0"/>
           </a:p>
@@ -881,7 +881,7 @@
             <a:fld id="{B61BEF0D-F0BB-DE4B-95CE-6DB70DBA9567}" type="datetimeFigureOut">
               <a:rPr lang="en-US" dirty="0"/>
               <a:pPr/>
-              <a:t>12/24/2019</a:t>
+              <a:t>1/8/2020</a:t>
             </a:fld>
             <a:endParaRPr lang="en-US" dirty="0"/>
           </a:p>
@@ -1118,7 +1118,7 @@
             <a:fld id="{B61BEF0D-F0BB-DE4B-95CE-6DB70DBA9567}" type="datetimeFigureOut">
               <a:rPr lang="en-US" dirty="0"/>
               <a:pPr/>
-              <a:t>12/24/2019</a:t>
+              <a:t>1/8/2020</a:t>
             </a:fld>
             <a:endParaRPr lang="en-US" dirty="0"/>
           </a:p>
@@ -1422,7 +1422,7 @@
             <a:fld id="{B61BEF0D-F0BB-DE4B-95CE-6DB70DBA9567}" type="datetimeFigureOut">
               <a:rPr lang="en-US" dirty="0"/>
               <a:pPr/>
-              <a:t>12/24/2019</a:t>
+              <a:t>1/8/2020</a:t>
             </a:fld>
             <a:endParaRPr lang="en-US" dirty="0"/>
           </a:p>
@@ -1721,7 +1721,7 @@
             <a:fld id="{B61BEF0D-F0BB-DE4B-95CE-6DB70DBA9567}" type="datetimeFigureOut">
               <a:rPr lang="en-US" dirty="0"/>
               <a:pPr/>
-              <a:t>12/24/2019</a:t>
+              <a:t>1/8/2020</a:t>
             </a:fld>
             <a:endParaRPr lang="en-US" dirty="0"/>
           </a:p>
@@ -2140,7 +2140,7 @@
             <a:fld id="{B61BEF0D-F0BB-DE4B-95CE-6DB70DBA9567}" type="datetimeFigureOut">
               <a:rPr lang="en-US" dirty="0"/>
               <a:pPr/>
-              <a:t>12/24/2019</a:t>
+              <a:t>1/8/2020</a:t>
             </a:fld>
             <a:endParaRPr lang="en-US" dirty="0"/>
           </a:p>
@@ -2299,7 +2299,7 @@
             <a:fld id="{B61BEF0D-F0BB-DE4B-95CE-6DB70DBA9567}" type="datetimeFigureOut">
               <a:rPr lang="en-US" dirty="0"/>
               <a:pPr/>
-              <a:t>12/24/2019</a:t>
+              <a:t>1/8/2020</a:t>
             </a:fld>
             <a:endParaRPr lang="en-US" dirty="0"/>
           </a:p>
@@ -2391,7 +2391,7 @@
             <a:fld id="{B61BEF0D-F0BB-DE4B-95CE-6DB70DBA9567}" type="datetimeFigureOut">
               <a:rPr lang="en-US" dirty="0"/>
               <a:pPr/>
-              <a:t>12/24/2019</a:t>
+              <a:t>1/8/2020</a:t>
             </a:fld>
             <a:endParaRPr lang="en-US" dirty="0"/>
           </a:p>
@@ -2766,7 +2766,7 @@
             <a:fld id="{B61BEF0D-F0BB-DE4B-95CE-6DB70DBA9567}" type="datetimeFigureOut">
               <a:rPr lang="en-US" dirty="0"/>
               <a:pPr/>
-              <a:t>12/24/2019</a:t>
+              <a:t>1/8/2020</a:t>
             </a:fld>
             <a:endParaRPr lang="en-US" dirty="0"/>
           </a:p>
@@ -3052,7 +3052,7 @@
             <a:fld id="{B61BEF0D-F0BB-DE4B-95CE-6DB70DBA9567}" type="datetimeFigureOut">
               <a:rPr lang="en-US" dirty="0"/>
               <a:pPr/>
-              <a:t>12/24/2019</a:t>
+              <a:t>1/8/2020</a:t>
             </a:fld>
             <a:endParaRPr lang="en-US" dirty="0"/>
           </a:p>
@@ -3260,7 +3260,7 @@
             <a:fld id="{B61BEF0D-F0BB-DE4B-95CE-6DB70DBA9567}" type="datetimeFigureOut">
               <a:rPr lang="en-US" dirty="0"/>
               <a:pPr/>
-              <a:t>12/24/2019</a:t>
+              <a:t>1/8/2020</a:t>
             </a:fld>
             <a:endParaRPr lang="en-US" dirty="0"/>
           </a:p>
@@ -3862,7 +3862,7 @@
           <p:cNvPr id="7" name="Titolo 1">
             <a:extLst>
               <a:ext uri="{FF2B5EF4-FFF2-40B4-BE49-F238E27FC236}">
-                <a16:creationId xmlns:a16="http://schemas.microsoft.com/office/drawing/2014/main" xmlns="" id="{1C5DB0D8-64CE-403D-A876-8CCFD2E694D0}"/>
+                <a16:creationId xmlns="" xmlns:a16="http://schemas.microsoft.com/office/drawing/2014/main" id="{1C5DB0D8-64CE-403D-A876-8CCFD2E694D0}"/>
               </a:ext>
             </a:extLst>
           </p:cNvPr>
@@ -3925,7 +3925,7 @@
           <p:cNvPr id="8" name="Sottotitolo 2">
             <a:extLst>
               <a:ext uri="{FF2B5EF4-FFF2-40B4-BE49-F238E27FC236}">
-                <a16:creationId xmlns:a16="http://schemas.microsoft.com/office/drawing/2014/main" xmlns="" id="{443E930C-963B-4CB5-89E7-3EAC5E1BB5EC}"/>
+                <a16:creationId xmlns="" xmlns:a16="http://schemas.microsoft.com/office/drawing/2014/main" id="{443E930C-963B-4CB5-89E7-3EAC5E1BB5EC}"/>
               </a:ext>
             </a:extLst>
           </p:cNvPr>
@@ -4075,7 +4075,7 @@
           <p:cNvPr id="4" name="Titolo 1">
             <a:extLst>
               <a:ext uri="{FF2B5EF4-FFF2-40B4-BE49-F238E27FC236}">
-                <a16:creationId xmlns:a16="http://schemas.microsoft.com/office/drawing/2014/main" xmlns="" id="{A9EEA6F2-3B94-4E48-92B7-85D4D7273DBD}"/>
+                <a16:creationId xmlns="" xmlns:a16="http://schemas.microsoft.com/office/drawing/2014/main" id="{A9EEA6F2-3B94-4E48-92B7-85D4D7273DBD}"/>
               </a:ext>
             </a:extLst>
           </p:cNvPr>
@@ -10706,7 +10706,7 @@
           <p:cNvPr id="4" name="Titolo 1">
             <a:extLst>
               <a:ext uri="{FF2B5EF4-FFF2-40B4-BE49-F238E27FC236}">
-                <a16:creationId xmlns:a16="http://schemas.microsoft.com/office/drawing/2014/main" xmlns="" id="{A9EEA6F2-3B94-4E48-92B7-85D4D7273DBD}"/>
+                <a16:creationId xmlns="" xmlns:a16="http://schemas.microsoft.com/office/drawing/2014/main" id="{A9EEA6F2-3B94-4E48-92B7-85D4D7273DBD}"/>
               </a:ext>
             </a:extLst>
           </p:cNvPr>
@@ -11835,7 +11835,7 @@
           <p:cNvPr id="4" name="Titolo 1">
             <a:extLst>
               <a:ext uri="{FF2B5EF4-FFF2-40B4-BE49-F238E27FC236}">
-                <a16:creationId xmlns:a16="http://schemas.microsoft.com/office/drawing/2014/main" xmlns="" id="{A9EEA6F2-3B94-4E48-92B7-85D4D7273DBD}"/>
+                <a16:creationId xmlns="" xmlns:a16="http://schemas.microsoft.com/office/drawing/2014/main" id="{A9EEA6F2-3B94-4E48-92B7-85D4D7273DBD}"/>
               </a:ext>
             </a:extLst>
           </p:cNvPr>
@@ -13873,11 +13873,11 @@
   <p:clrMapOvr>
     <a:masterClrMapping/>
   </p:clrMapOvr>
-  <mc:AlternateContent xmlns:mc="http://schemas.openxmlformats.org/markup-compatibility/2006">
-    <mc:Choice xmlns:p14="http://schemas.microsoft.com/office/powerpoint/2010/main" Requires="p14">
+  <mc:AlternateContent xmlns:mc="http://schemas.openxmlformats.org/markup-compatibility/2006" xmlns:p14="http://schemas.microsoft.com/office/powerpoint/2010/main">
+    <mc:Choice Requires="p14">
       <p:transition spd="slow" p14:dur="2000"/>
     </mc:Choice>
-    <mc:Fallback>
+    <mc:Fallback xmlns="">
       <p:transition spd="slow"/>
     </mc:Fallback>
   </mc:AlternateContent>
@@ -15036,7 +15036,7 @@
           <p:cNvPr id="4" name="Titolo 1">
             <a:extLst>
               <a:ext uri="{FF2B5EF4-FFF2-40B4-BE49-F238E27FC236}">
-                <a16:creationId xmlns:a16="http://schemas.microsoft.com/office/drawing/2014/main" xmlns="" id="{A9EEA6F2-3B94-4E48-92B7-85D4D7273DBD}"/>
+                <a16:creationId xmlns="" xmlns:a16="http://schemas.microsoft.com/office/drawing/2014/main" id="{A9EEA6F2-3B94-4E48-92B7-85D4D7273DBD}"/>
               </a:ext>
             </a:extLst>
           </p:cNvPr>
@@ -15345,11 +15345,11 @@
   <p:clrMapOvr>
     <a:masterClrMapping/>
   </p:clrMapOvr>
-  <mc:AlternateContent xmlns:mc="http://schemas.openxmlformats.org/markup-compatibility/2006">
-    <mc:Choice xmlns:p14="http://schemas.microsoft.com/office/powerpoint/2010/main" Requires="p14">
+  <mc:AlternateContent xmlns:mc="http://schemas.openxmlformats.org/markup-compatibility/2006" xmlns:p14="http://schemas.microsoft.com/office/powerpoint/2010/main">
+    <mc:Choice Requires="p14">
       <p:transition spd="slow" p14:dur="2000"/>
     </mc:Choice>
-    <mc:Fallback>
+    <mc:Fallback xmlns="">
       <p:transition spd="slow"/>
     </mc:Fallback>
   </mc:AlternateContent>
@@ -15748,7 +15748,7 @@
           <p:cNvPr id="4" name="Titolo 1">
             <a:extLst>
               <a:ext uri="{FF2B5EF4-FFF2-40B4-BE49-F238E27FC236}">
-                <a16:creationId xmlns:a16="http://schemas.microsoft.com/office/drawing/2014/main" xmlns="" id="{A9EEA6F2-3B94-4E48-92B7-85D4D7273DBD}"/>
+                <a16:creationId xmlns="" xmlns:a16="http://schemas.microsoft.com/office/drawing/2014/main" id="{A9EEA6F2-3B94-4E48-92B7-85D4D7273DBD}"/>
               </a:ext>
             </a:extLst>
           </p:cNvPr>
@@ -15898,11 +15898,11 @@
   <p:clrMapOvr>
     <a:masterClrMapping/>
   </p:clrMapOvr>
-  <mc:AlternateContent xmlns:mc="http://schemas.openxmlformats.org/markup-compatibility/2006">
-    <mc:Choice xmlns:p14="http://schemas.microsoft.com/office/powerpoint/2010/main" Requires="p14">
+  <mc:AlternateContent xmlns:mc="http://schemas.openxmlformats.org/markup-compatibility/2006" xmlns:p14="http://schemas.microsoft.com/office/powerpoint/2010/main">
+    <mc:Choice Requires="p14">
       <p:transition spd="slow" p14:dur="2000"/>
     </mc:Choice>
-    <mc:Fallback>
+    <mc:Fallback xmlns="">
       <p:transition spd="slow"/>
     </mc:Fallback>
   </mc:AlternateContent>
@@ -16020,7 +16020,7 @@
           <p:cNvPr id="4" name="Titolo 1">
             <a:extLst>
               <a:ext uri="{FF2B5EF4-FFF2-40B4-BE49-F238E27FC236}">
-                <a16:creationId xmlns:a16="http://schemas.microsoft.com/office/drawing/2014/main" xmlns="" id="{A9EEA6F2-3B94-4E48-92B7-85D4D7273DBD}"/>
+                <a16:creationId xmlns="" xmlns:a16="http://schemas.microsoft.com/office/drawing/2014/main" id="{A9EEA6F2-3B94-4E48-92B7-85D4D7273DBD}"/>
               </a:ext>
             </a:extLst>
           </p:cNvPr>
@@ -16069,7 +16069,7 @@
           <p:cNvPr id="3" name="Segnaposto contenuto 2">
             <a:extLst>
               <a:ext uri="{FF2B5EF4-FFF2-40B4-BE49-F238E27FC236}">
-                <a16:creationId xmlns:a16="http://schemas.microsoft.com/office/drawing/2014/main" xmlns="" id="{E52E2B75-CA45-4117-A3A1-9E9D32618864}"/>
+                <a16:creationId xmlns="" xmlns:a16="http://schemas.microsoft.com/office/drawing/2014/main" id="{E52E2B75-CA45-4117-A3A1-9E9D32618864}"/>
               </a:ext>
             </a:extLst>
           </p:cNvPr>
@@ -17032,7 +17032,7 @@
           <p:cNvPr id="4" name="Titolo 1">
             <a:extLst>
               <a:ext uri="{FF2B5EF4-FFF2-40B4-BE49-F238E27FC236}">
-                <a16:creationId xmlns:a16="http://schemas.microsoft.com/office/drawing/2014/main" xmlns="" id="{A9EEA6F2-3B94-4E48-92B7-85D4D7273DBD}"/>
+                <a16:creationId xmlns="" xmlns:a16="http://schemas.microsoft.com/office/drawing/2014/main" id="{A9EEA6F2-3B94-4E48-92B7-85D4D7273DBD}"/>
               </a:ext>
             </a:extLst>
           </p:cNvPr>
@@ -18139,7 +18139,7 @@
           <p:cNvPr id="3" name="Titolo 1">
             <a:extLst>
               <a:ext uri="{FF2B5EF4-FFF2-40B4-BE49-F238E27FC236}">
-                <a16:creationId xmlns:a16="http://schemas.microsoft.com/office/drawing/2014/main" xmlns="" id="{A9EEA6F2-3B94-4E48-92B7-85D4D7273DBD}"/>
+                <a16:creationId xmlns="" xmlns:a16="http://schemas.microsoft.com/office/drawing/2014/main" id="{A9EEA6F2-3B94-4E48-92B7-85D4D7273DBD}"/>
               </a:ext>
             </a:extLst>
           </p:cNvPr>
@@ -19034,11 +19034,11 @@
   <p:clrMapOvr>
     <a:masterClrMapping/>
   </p:clrMapOvr>
-  <mc:AlternateContent xmlns:mc="http://schemas.openxmlformats.org/markup-compatibility/2006">
-    <mc:Choice xmlns:p14="http://schemas.microsoft.com/office/powerpoint/2010/main" Requires="p14">
+  <mc:AlternateContent xmlns:mc="http://schemas.openxmlformats.org/markup-compatibility/2006" xmlns:p14="http://schemas.microsoft.com/office/powerpoint/2010/main">
+    <mc:Choice Requires="p14">
       <p:transition spd="slow" p14:dur="2000"/>
     </mc:Choice>
-    <mc:Fallback>
+    <mc:Fallback xmlns="">
       <p:transition spd="slow"/>
     </mc:Fallback>
   </mc:AlternateContent>
@@ -19067,7 +19067,7 @@
           <p:cNvPr id="4" name="Titolo 1">
             <a:extLst>
               <a:ext uri="{FF2B5EF4-FFF2-40B4-BE49-F238E27FC236}">
-                <a16:creationId xmlns:a16="http://schemas.microsoft.com/office/drawing/2014/main" xmlns="" id="{A9EEA6F2-3B94-4E48-92B7-85D4D7273DBD}"/>
+                <a16:creationId xmlns="" xmlns:a16="http://schemas.microsoft.com/office/drawing/2014/main" id="{A9EEA6F2-3B94-4E48-92B7-85D4D7273DBD}"/>
               </a:ext>
             </a:extLst>
           </p:cNvPr>
@@ -19573,7 +19573,7 @@
           <p:cNvPr id="4" name="Titolo 1">
             <a:extLst>
               <a:ext uri="{FF2B5EF4-FFF2-40B4-BE49-F238E27FC236}">
-                <a16:creationId xmlns:a16="http://schemas.microsoft.com/office/drawing/2014/main" xmlns="" id="{A9EEA6F2-3B94-4E48-92B7-85D4D7273DBD}"/>
+                <a16:creationId xmlns="" xmlns:a16="http://schemas.microsoft.com/office/drawing/2014/main" id="{A9EEA6F2-3B94-4E48-92B7-85D4D7273DBD}"/>
               </a:ext>
             </a:extLst>
           </p:cNvPr>
@@ -19923,7 +19923,7 @@
           <p:cNvPr id="5" name="Titolo 1">
             <a:extLst>
               <a:ext uri="{FF2B5EF4-FFF2-40B4-BE49-F238E27FC236}">
-                <a16:creationId xmlns:a16="http://schemas.microsoft.com/office/drawing/2014/main" xmlns="" id="{A9EEA6F2-3B94-4E48-92B7-85D4D7273DBD}"/>
+                <a16:creationId xmlns="" xmlns:a16="http://schemas.microsoft.com/office/drawing/2014/main" id="{A9EEA6F2-3B94-4E48-92B7-85D4D7273DBD}"/>
               </a:ext>
             </a:extLst>
           </p:cNvPr>
@@ -20277,7 +20277,7 @@
           <p:cNvPr id="4" name="Titolo 1">
             <a:extLst>
               <a:ext uri="{FF2B5EF4-FFF2-40B4-BE49-F238E27FC236}">
-                <a16:creationId xmlns:a16="http://schemas.microsoft.com/office/drawing/2014/main" xmlns="" id="{A9EEA6F2-3B94-4E48-92B7-85D4D7273DBD}"/>
+                <a16:creationId xmlns="" xmlns:a16="http://schemas.microsoft.com/office/drawing/2014/main" id="{A9EEA6F2-3B94-4E48-92B7-85D4D7273DBD}"/>
               </a:ext>
             </a:extLst>
           </p:cNvPr>
@@ -20375,11 +20375,11 @@
   <p:clrMapOvr>
     <a:masterClrMapping/>
   </p:clrMapOvr>
-  <mc:AlternateContent xmlns:mc="http://schemas.openxmlformats.org/markup-compatibility/2006">
-    <mc:Choice xmlns:p14="http://schemas.microsoft.com/office/powerpoint/2010/main" Requires="p14">
+  <mc:AlternateContent xmlns:mc="http://schemas.openxmlformats.org/markup-compatibility/2006" xmlns:p14="http://schemas.microsoft.com/office/powerpoint/2010/main">
+    <mc:Choice Requires="p14">
       <p:transition spd="slow" p14:dur="2000"/>
     </mc:Choice>
-    <mc:Fallback>
+    <mc:Fallback xmlns="">
       <p:transition spd="slow"/>
     </mc:Fallback>
   </mc:AlternateContent>
@@ -20415,7 +20415,7 @@
           <p:cNvPr id="4" name="Titolo 1">
             <a:extLst>
               <a:ext uri="{FF2B5EF4-FFF2-40B4-BE49-F238E27FC236}">
-                <a16:creationId xmlns:a16="http://schemas.microsoft.com/office/drawing/2014/main" xmlns="" id="{A9EEA6F2-3B94-4E48-92B7-85D4D7273DBD}"/>
+                <a16:creationId xmlns="" xmlns:a16="http://schemas.microsoft.com/office/drawing/2014/main" id="{A9EEA6F2-3B94-4E48-92B7-85D4D7273DBD}"/>
               </a:ext>
             </a:extLst>
           </p:cNvPr>
@@ -21319,7 +21319,7 @@
           <p:cNvPr id="4" name="Titolo 1">
             <a:extLst>
               <a:ext uri="{FF2B5EF4-FFF2-40B4-BE49-F238E27FC236}">
-                <a16:creationId xmlns:a16="http://schemas.microsoft.com/office/drawing/2014/main" xmlns="" id="{A9EEA6F2-3B94-4E48-92B7-85D4D7273DBD}"/>
+                <a16:creationId xmlns="" xmlns:a16="http://schemas.microsoft.com/office/drawing/2014/main" id="{A9EEA6F2-3B94-4E48-92B7-85D4D7273DBD}"/>
               </a:ext>
             </a:extLst>
           </p:cNvPr>
@@ -22186,7 +22186,7 @@
           <p:cNvPr id="4" name="Titolo 1">
             <a:extLst>
               <a:ext uri="{FF2B5EF4-FFF2-40B4-BE49-F238E27FC236}">
-                <a16:creationId xmlns:a16="http://schemas.microsoft.com/office/drawing/2014/main" xmlns="" id="{A9EEA6F2-3B94-4E48-92B7-85D4D7273DBD}"/>
+                <a16:creationId xmlns="" xmlns:a16="http://schemas.microsoft.com/office/drawing/2014/main" id="{A9EEA6F2-3B94-4E48-92B7-85D4D7273DBD}"/>
               </a:ext>
             </a:extLst>
           </p:cNvPr>
@@ -23352,7 +23352,7 @@
           <p:cNvPr id="5" name="Segnaposto contenuto 2">
             <a:extLst>
               <a:ext uri="{FF2B5EF4-FFF2-40B4-BE49-F238E27FC236}">
-                <a16:creationId xmlns:a16="http://schemas.microsoft.com/office/drawing/2014/main" xmlns="" id="{E52E2B75-CA45-4117-A3A1-9E9D32618864}"/>
+                <a16:creationId xmlns="" xmlns:a16="http://schemas.microsoft.com/office/drawing/2014/main" id="{E52E2B75-CA45-4117-A3A1-9E9D32618864}"/>
               </a:ext>
             </a:extLst>
           </p:cNvPr>
@@ -23832,7 +23832,7 @@
           <p:cNvPr id="4" name="Titolo 1">
             <a:extLst>
               <a:ext uri="{FF2B5EF4-FFF2-40B4-BE49-F238E27FC236}">
-                <a16:creationId xmlns:a16="http://schemas.microsoft.com/office/drawing/2014/main" xmlns="" id="{A9EEA6F2-3B94-4E48-92B7-85D4D7273DBD}"/>
+                <a16:creationId xmlns="" xmlns:a16="http://schemas.microsoft.com/office/drawing/2014/main" id="{A9EEA6F2-3B94-4E48-92B7-85D4D7273DBD}"/>
               </a:ext>
             </a:extLst>
           </p:cNvPr>
@@ -23978,7 +23978,7 @@
           <p:cNvPr id="11" name="Titolo 1">
             <a:extLst>
               <a:ext uri="{FF2B5EF4-FFF2-40B4-BE49-F238E27FC236}">
-                <a16:creationId xmlns:a16="http://schemas.microsoft.com/office/drawing/2014/main" xmlns="" id="{A9EEA6F2-3B94-4E48-92B7-85D4D7273DBD}"/>
+                <a16:creationId xmlns="" xmlns:a16="http://schemas.microsoft.com/office/drawing/2014/main" id="{A9EEA6F2-3B94-4E48-92B7-85D4D7273DBD}"/>
               </a:ext>
             </a:extLst>
           </p:cNvPr>
@@ -24088,7 +24088,7 @@
           <p:cNvPr id="12" name="Titolo 1">
             <a:extLst>
               <a:ext uri="{FF2B5EF4-FFF2-40B4-BE49-F238E27FC236}">
-                <a16:creationId xmlns:a16="http://schemas.microsoft.com/office/drawing/2014/main" xmlns="" id="{A9EEA6F2-3B94-4E48-92B7-85D4D7273DBD}"/>
+                <a16:creationId xmlns="" xmlns:a16="http://schemas.microsoft.com/office/drawing/2014/main" id="{A9EEA6F2-3B94-4E48-92B7-85D4D7273DBD}"/>
               </a:ext>
             </a:extLst>
           </p:cNvPr>
@@ -24459,7 +24459,7 @@
           <p:cNvPr id="21" name="Titolo 1">
             <a:extLst>
               <a:ext uri="{FF2B5EF4-FFF2-40B4-BE49-F238E27FC236}">
-                <a16:creationId xmlns:a16="http://schemas.microsoft.com/office/drawing/2014/main" xmlns="" id="{A9EEA6F2-3B94-4E48-92B7-85D4D7273DBD}"/>
+                <a16:creationId xmlns="" xmlns:a16="http://schemas.microsoft.com/office/drawing/2014/main" id="{A9EEA6F2-3B94-4E48-92B7-85D4D7273DBD}"/>
               </a:ext>
             </a:extLst>
           </p:cNvPr>
@@ -24601,7 +24601,67 @@
                 <a:latin typeface="Calibri" panose="020F0502020204030204" pitchFamily="34" charset="0"/>
                 <a:cs typeface="Calibri" panose="020F0502020204030204" pitchFamily="34" charset="0"/>
               </a:rPr>
-              <a:t>Per ogni feature e label è stato valutato con quante altre feature/label fosse altamente correlate</a:t>
+              <a:t>Per ogni feature e label è stato valutato con quante altre </a:t>
+            </a:r>
+            <a:r>
+              <a:rPr lang="it-IT" sz="2000" dirty="0" err="1">
+                <a:solidFill>
+                  <a:schemeClr val="tx2"/>
+                </a:solidFill>
+                <a:latin typeface="Calibri" panose="020F0502020204030204" pitchFamily="34" charset="0"/>
+                <a:cs typeface="Calibri" panose="020F0502020204030204" pitchFamily="34" charset="0"/>
+              </a:rPr>
+              <a:t>feature</a:t>
+            </a:r>
+            <a:r>
+              <a:rPr lang="it-IT" sz="2000" dirty="0">
+                <a:solidFill>
+                  <a:schemeClr val="tx2"/>
+                </a:solidFill>
+                <a:latin typeface="Calibri" panose="020F0502020204030204" pitchFamily="34" charset="0"/>
+                <a:cs typeface="Calibri" panose="020F0502020204030204" pitchFamily="34" charset="0"/>
+              </a:rPr>
+              <a:t>/</a:t>
+            </a:r>
+            <a:r>
+              <a:rPr lang="it-IT" sz="2000" dirty="0" err="1">
+                <a:solidFill>
+                  <a:schemeClr val="tx2"/>
+                </a:solidFill>
+                <a:latin typeface="Calibri" panose="020F0502020204030204" pitchFamily="34" charset="0"/>
+                <a:cs typeface="Calibri" panose="020F0502020204030204" pitchFamily="34" charset="0"/>
+              </a:rPr>
+              <a:t>label</a:t>
+            </a:r>
+            <a:r>
+              <a:rPr lang="it-IT" sz="2000" dirty="0">
+                <a:solidFill>
+                  <a:schemeClr val="tx2"/>
+                </a:solidFill>
+                <a:latin typeface="Calibri" panose="020F0502020204030204" pitchFamily="34" charset="0"/>
+                <a:cs typeface="Calibri" panose="020F0502020204030204" pitchFamily="34" charset="0"/>
+              </a:rPr>
+              <a:t> </a:t>
+            </a:r>
+            <a:r>
+              <a:rPr lang="it-IT" sz="2000" dirty="0" smtClean="0">
+                <a:solidFill>
+                  <a:schemeClr val="tx2"/>
+                </a:solidFill>
+                <a:latin typeface="Calibri" panose="020F0502020204030204" pitchFamily="34" charset="0"/>
+                <a:cs typeface="Calibri" panose="020F0502020204030204" pitchFamily="34" charset="0"/>
+              </a:rPr>
+              <a:t>fossero </a:t>
+            </a:r>
+            <a:r>
+              <a:rPr lang="it-IT" sz="2000" dirty="0">
+                <a:solidFill>
+                  <a:schemeClr val="tx2"/>
+                </a:solidFill>
+                <a:latin typeface="Calibri" panose="020F0502020204030204" pitchFamily="34" charset="0"/>
+                <a:cs typeface="Calibri" panose="020F0502020204030204" pitchFamily="34" charset="0"/>
+              </a:rPr>
+              <a:t>altamente correlate</a:t>
             </a:r>
           </a:p>
           <a:p>
@@ -26345,7 +26405,7 @@
           <p:cNvPr id="4" name="Titolo 1">
             <a:extLst>
               <a:ext uri="{FF2B5EF4-FFF2-40B4-BE49-F238E27FC236}">
-                <a16:creationId xmlns:a16="http://schemas.microsoft.com/office/drawing/2014/main" xmlns="" id="{A9EEA6F2-3B94-4E48-92B7-85D4D7273DBD}"/>
+                <a16:creationId xmlns="" xmlns:a16="http://schemas.microsoft.com/office/drawing/2014/main" id="{A9EEA6F2-3B94-4E48-92B7-85D4D7273DBD}"/>
               </a:ext>
             </a:extLst>
           </p:cNvPr>
@@ -26387,7 +26447,7 @@
           <p:cNvPr id="5" name="Segnaposto contenuto 2">
             <a:extLst>
               <a:ext uri="{FF2B5EF4-FFF2-40B4-BE49-F238E27FC236}">
-                <a16:creationId xmlns:a16="http://schemas.microsoft.com/office/drawing/2014/main" xmlns="" id="{E52E2B75-CA45-4117-A3A1-9E9D32618864}"/>
+                <a16:creationId xmlns="" xmlns:a16="http://schemas.microsoft.com/office/drawing/2014/main" id="{E52E2B75-CA45-4117-A3A1-9E9D32618864}"/>
               </a:ext>
             </a:extLst>
           </p:cNvPr>
@@ -26683,11 +26743,11 @@
   <p:clrMapOvr>
     <a:masterClrMapping/>
   </p:clrMapOvr>
-  <mc:AlternateContent xmlns:mc="http://schemas.openxmlformats.org/markup-compatibility/2006">
-    <mc:Choice xmlns:p14="http://schemas.microsoft.com/office/powerpoint/2010/main" Requires="p14">
+  <mc:AlternateContent xmlns:mc="http://schemas.openxmlformats.org/markup-compatibility/2006" xmlns:p14="http://schemas.microsoft.com/office/powerpoint/2010/main">
+    <mc:Choice Requires="p14">
       <p:transition spd="slow" p14:dur="2000"/>
     </mc:Choice>
-    <mc:Fallback>
+    <mc:Fallback xmlns="">
       <p:transition spd="slow"/>
     </mc:Fallback>
   </mc:AlternateContent>
@@ -26716,7 +26776,7 @@
           <p:cNvPr id="4" name="Titolo 1">
             <a:extLst>
               <a:ext uri="{FF2B5EF4-FFF2-40B4-BE49-F238E27FC236}">
-                <a16:creationId xmlns:a16="http://schemas.microsoft.com/office/drawing/2014/main" xmlns="" id="{A9EEA6F2-3B94-4E48-92B7-85D4D7273DBD}"/>
+                <a16:creationId xmlns="" xmlns:a16="http://schemas.microsoft.com/office/drawing/2014/main" id="{A9EEA6F2-3B94-4E48-92B7-85D4D7273DBD}"/>
               </a:ext>
             </a:extLst>
           </p:cNvPr>
@@ -26916,11 +26976,11 @@
   <p:clrMapOvr>
     <a:masterClrMapping/>
   </p:clrMapOvr>
-  <mc:AlternateContent xmlns:mc="http://schemas.openxmlformats.org/markup-compatibility/2006">
-    <mc:Choice xmlns:p14="http://schemas.microsoft.com/office/powerpoint/2010/main" Requires="p14">
+  <mc:AlternateContent xmlns:mc="http://schemas.openxmlformats.org/markup-compatibility/2006" xmlns:p14="http://schemas.microsoft.com/office/powerpoint/2010/main">
+    <mc:Choice Requires="p14">
       <p:transition spd="slow" p14:dur="2000"/>
     </mc:Choice>
-    <mc:Fallback>
+    <mc:Fallback xmlns="">
       <p:transition spd="slow"/>
     </mc:Fallback>
   </mc:AlternateContent>
@@ -26949,7 +27009,7 @@
           <p:cNvPr id="4" name="Titolo 1">
             <a:extLst>
               <a:ext uri="{FF2B5EF4-FFF2-40B4-BE49-F238E27FC236}">
-                <a16:creationId xmlns:a16="http://schemas.microsoft.com/office/drawing/2014/main" xmlns="" id="{A9EEA6F2-3B94-4E48-92B7-85D4D7273DBD}"/>
+                <a16:creationId xmlns="" xmlns:a16="http://schemas.microsoft.com/office/drawing/2014/main" id="{A9EEA6F2-3B94-4E48-92B7-85D4D7273DBD}"/>
               </a:ext>
             </a:extLst>
           </p:cNvPr>
@@ -27370,11 +27430,11 @@
   <p:clrMapOvr>
     <a:masterClrMapping/>
   </p:clrMapOvr>
-  <mc:AlternateContent xmlns:mc="http://schemas.openxmlformats.org/markup-compatibility/2006">
-    <mc:Choice xmlns:p14="http://schemas.microsoft.com/office/powerpoint/2010/main" Requires="p14">
+  <mc:AlternateContent xmlns:mc="http://schemas.openxmlformats.org/markup-compatibility/2006" xmlns:p14="http://schemas.microsoft.com/office/powerpoint/2010/main">
+    <mc:Choice Requires="p14">
       <p:transition spd="slow" p14:dur="2000"/>
     </mc:Choice>
-    <mc:Fallback>
+    <mc:Fallback xmlns="">
       <p:transition spd="slow"/>
     </mc:Fallback>
   </mc:AlternateContent>
@@ -27935,7 +27995,7 @@
           <p:cNvPr id="4" name="Titolo 1">
             <a:extLst>
               <a:ext uri="{FF2B5EF4-FFF2-40B4-BE49-F238E27FC236}">
-                <a16:creationId xmlns:a16="http://schemas.microsoft.com/office/drawing/2014/main" xmlns="" id="{A9EEA6F2-3B94-4E48-92B7-85D4D7273DBD}"/>
+                <a16:creationId xmlns="" xmlns:a16="http://schemas.microsoft.com/office/drawing/2014/main" id="{A9EEA6F2-3B94-4E48-92B7-85D4D7273DBD}"/>
               </a:ext>
             </a:extLst>
           </p:cNvPr>
@@ -27977,7 +28037,7 @@
           <p:cNvPr id="3" name="Segnaposto contenuto 2">
             <a:extLst>
               <a:ext uri="{FF2B5EF4-FFF2-40B4-BE49-F238E27FC236}">
-                <a16:creationId xmlns:a16="http://schemas.microsoft.com/office/drawing/2014/main" xmlns="" id="{E52E2B75-CA45-4117-A3A1-9E9D32618864}"/>
+                <a16:creationId xmlns="" xmlns:a16="http://schemas.microsoft.com/office/drawing/2014/main" id="{E52E2B75-CA45-4117-A3A1-9E9D32618864}"/>
               </a:ext>
             </a:extLst>
           </p:cNvPr>

</xml_diff>